<commit_message>
LFU Window Enable/Disable mode is added
</commit_message>
<xml_diff>
--- a/Manuals/CUDA_setting.pptx
+++ b/Manuals/CUDA_setting.pptx
@@ -112,6 +112,11 @@
       </a:defRPr>
     </a:lvl9pPr>
   </p:defaultTextStyle>
+  <p:extLst>
+    <p:ext uri="{EFAFB233-063F-42B5-8137-9DF3F51BA10A}">
+      <p15:sldGuideLst xmlns:p15="http://schemas.microsoft.com/office/powerpoint/2012/main"/>
+    </p:ext>
+  </p:extLst>
 </p:presentation>
 </file>
 
@@ -6443,6 +6448,212 @@
           </a:p>
         </p:txBody>
       </p:sp>
+      <p:sp>
+        <p:nvSpPr>
+          <p:cNvPr id="37" name="TextBox 36">
+            <a:extLst>
+              <a:ext uri="{FF2B5EF4-FFF2-40B4-BE49-F238E27FC236}">
+                <a16:creationId xmlns:a16="http://schemas.microsoft.com/office/drawing/2014/main" id="{442B9FF8-7F91-4706-9CD7-922140B32EBC}"/>
+              </a:ext>
+            </a:extLst>
+          </p:cNvPr>
+          <p:cNvSpPr txBox="1"/>
+          <p:nvPr/>
+        </p:nvSpPr>
+        <p:spPr>
+          <a:xfrm>
+            <a:off x="1647157" y="112657"/>
+            <a:ext cx="10084940" cy="1754326"/>
+          </a:xfrm>
+          <a:prstGeom prst="rect">
+            <a:avLst/>
+          </a:prstGeom>
+          <a:noFill/>
+        </p:spPr>
+        <p:txBody>
+          <a:bodyPr wrap="none" rtlCol="0">
+            <a:spAutoFit/>
+          </a:bodyPr>
+          <a:lstStyle/>
+          <a:p>
+            <a:r>
+              <a:rPr lang="en-US" altLang="ko-KR"/>
+              <a:t>LFU_Window, Background </a:t>
+            </a:r>
+            <a:r>
+              <a:rPr lang="ko-KR" altLang="en-US"/>
+              <a:t>캐시를 없애고</a:t>
+            </a:r>
+            <a:r>
+              <a:rPr lang="en-US" altLang="ko-KR"/>
+              <a:t>(LF_Renderer</a:t>
+            </a:r>
+            <a:r>
+              <a:rPr lang="ko-KR" altLang="en-US"/>
+              <a:t> 생성자에서 주석 처리</a:t>
+            </a:r>
+            <a:r>
+              <a:rPr lang="en-US" altLang="ko-KR"/>
+              <a:t>, worker threads</a:t>
+            </a:r>
+            <a:r>
+              <a:rPr lang="ko-KR" altLang="en-US"/>
+              <a:t>도</a:t>
+            </a:r>
+            <a:r>
+              <a:rPr lang="en-US" altLang="ko-KR"/>
+              <a:t>)</a:t>
+            </a:r>
+          </a:p>
+          <a:p>
+            <a:endParaRPr lang="en-US" altLang="ko-KR"/>
+          </a:p>
+          <a:p>
+            <a:r>
+              <a:rPr lang="ko-KR" altLang="en-US"/>
+              <a:t>서버에서 </a:t>
+            </a:r>
+            <a:r>
+              <a:rPr lang="en-US" altLang="ko-KR"/>
+              <a:t>send / </a:t>
+            </a:r>
+            <a:r>
+              <a:rPr lang="ko-KR" altLang="en-US"/>
+              <a:t>클라이언트에서 </a:t>
+            </a:r>
+            <a:r>
+              <a:rPr lang="en-US" altLang="ko-KR"/>
+              <a:t>receive </a:t>
+            </a:r>
+            <a:r>
+              <a:rPr lang="ko-KR" altLang="en-US"/>
+              <a:t>함수 구현 </a:t>
+            </a:r>
+            <a:r>
+              <a:rPr lang="en-US" altLang="ko-KR"/>
+              <a:t>(on-demand)</a:t>
+            </a:r>
+          </a:p>
+          <a:p>
+            <a:r>
+              <a:rPr lang="ko-KR" altLang="en-US"/>
+              <a:t>클라이언트는 </a:t>
+            </a:r>
+            <a:r>
+              <a:rPr lang="en-US" altLang="ko-KR"/>
+              <a:t>slice id</a:t>
+            </a:r>
+            <a:r>
+              <a:rPr lang="ko-KR" altLang="en-US"/>
+              <a:t>를 받으면 </a:t>
+            </a:r>
+            <a:r>
+              <a:rPr lang="en-US" altLang="ko-KR"/>
+              <a:t>put </a:t>
+            </a:r>
+            <a:r>
+              <a:rPr lang="ko-KR" altLang="en-US"/>
+              <a:t>함수 내부에서 알아서 해시에 배치해줌</a:t>
+            </a:r>
+            <a:endParaRPr lang="en-US" altLang="ko-KR"/>
+          </a:p>
+          <a:p>
+            <a:pPr marL="285750" indent="-285750">
+              <a:buFont typeface="Wingdings" panose="05000000000000000000" pitchFamily="2" charset="2"/>
+              <a:buChar char="à"/>
+            </a:pPr>
+            <a:r>
+              <a:rPr lang="ko-KR" altLang="en-US">
+                <a:sym typeface="Wingdings" panose="05000000000000000000" pitchFamily="2" charset="2"/>
+              </a:rPr>
+              <a:t>단</a:t>
+            </a:r>
+            <a:r>
+              <a:rPr lang="en-US" altLang="ko-KR">
+                <a:sym typeface="Wingdings" panose="05000000000000000000" pitchFamily="2" charset="2"/>
+              </a:rPr>
+              <a:t>, </a:t>
+            </a:r>
+            <a:r>
+              <a:rPr lang="ko-KR" altLang="en-US">
+                <a:sym typeface="Wingdings" panose="05000000000000000000" pitchFamily="2" charset="2"/>
+              </a:rPr>
+              <a:t>서버에서 </a:t>
+            </a:r>
+            <a:r>
+              <a:rPr lang="en-US" altLang="ko-KR">
+                <a:sym typeface="Wingdings" panose="05000000000000000000" pitchFamily="2" charset="2"/>
+              </a:rPr>
+              <a:t>jpeg stream</a:t>
+            </a:r>
+            <a:r>
+              <a:rPr lang="ko-KR" altLang="en-US">
+                <a:sym typeface="Wingdings" panose="05000000000000000000" pitchFamily="2" charset="2"/>
+              </a:rPr>
+              <a:t>을 받아오기 때문에</a:t>
+            </a:r>
+            <a:r>
+              <a:rPr lang="en-US" altLang="ko-KR">
+                <a:sym typeface="Wingdings" panose="05000000000000000000" pitchFamily="2" charset="2"/>
+              </a:rPr>
+              <a:t>, put </a:t>
+            </a:r>
+            <a:r>
+              <a:rPr lang="ko-KR" altLang="en-US">
+                <a:sym typeface="Wingdings" panose="05000000000000000000" pitchFamily="2" charset="2"/>
+              </a:rPr>
+              <a:t>내부에서 </a:t>
+            </a:r>
+            <a:r>
+              <a:rPr lang="en-US" altLang="ko-KR">
+                <a:sym typeface="Wingdings" panose="05000000000000000000" pitchFamily="2" charset="2"/>
+              </a:rPr>
+              <a:t>decode </a:t>
+            </a:r>
+            <a:r>
+              <a:rPr lang="ko-KR" altLang="en-US">
+                <a:sym typeface="Wingdings" panose="05000000000000000000" pitchFamily="2" charset="2"/>
+              </a:rPr>
+              <a:t>함수를 추가 후 </a:t>
+            </a:r>
+            <a:br>
+              <a:rPr lang="en-US" altLang="ko-KR">
+                <a:sym typeface="Wingdings" panose="05000000000000000000" pitchFamily="2" charset="2"/>
+              </a:rPr>
+            </a:br>
+            <a:r>
+              <a:rPr lang="en-US" altLang="ko-KR">
+                <a:sym typeface="Wingdings" panose="05000000000000000000" pitchFamily="2" charset="2"/>
+              </a:rPr>
+              <a:t>device memory</a:t>
+            </a:r>
+            <a:r>
+              <a:rPr lang="ko-KR" altLang="en-US">
+                <a:sym typeface="Wingdings" panose="05000000000000000000" pitchFamily="2" charset="2"/>
+              </a:rPr>
+              <a:t>에는</a:t>
+            </a:r>
+            <a:r>
+              <a:rPr lang="en-US" altLang="ko-KR">
+                <a:sym typeface="Wingdings" panose="05000000000000000000" pitchFamily="2" charset="2"/>
+              </a:rPr>
+              <a:t> bgr </a:t>
+            </a:r>
+            <a:r>
+              <a:rPr lang="ko-KR" altLang="en-US">
+                <a:sym typeface="Wingdings" panose="05000000000000000000" pitchFamily="2" charset="2"/>
+              </a:rPr>
+              <a:t>데이터를 담을 수 있도록 바꿔야 할 듯</a:t>
+            </a:r>
+            <a:r>
+              <a:rPr lang="en-US" altLang="ko-KR">
+                <a:sym typeface="Wingdings" panose="05000000000000000000" pitchFamily="2" charset="2"/>
+              </a:rPr>
+              <a:t>.</a:t>
+            </a:r>
+          </a:p>
+        </p:txBody>
+      </p:sp>
     </p:spTree>
     <p:extLst>
       <p:ext uri="{BB962C8B-B14F-4D97-AF65-F5344CB8AC3E}">

</xml_diff>